<commit_message>
update OSDI slides to the final version
</commit_message>
<xml_diff>
--- a/presentations/ix_slides_osdi.pptx
+++ b/presentations/ix_slides_osdi.pptx
@@ -30,8 +30,8 @@
     <p:sldId id="309" r:id="rId18"/>
     <p:sldId id="329" r:id="rId19"/>
     <p:sldId id="316" r:id="rId20"/>
-    <p:sldId id="325" r:id="rId21"/>
-    <p:sldId id="335" r:id="rId22"/>
+    <p:sldId id="335" r:id="rId21"/>
+    <p:sldId id="325" r:id="rId22"/>
     <p:sldId id="337" r:id="rId23"/>
     <p:sldId id="323" r:id="rId24"/>
     <p:sldId id="315" r:id="rId25"/>
@@ -201,7 +201,7 @@
               <c:strCache>
                 <c:ptCount val="1"/>
                 <c:pt idx="0">
-                  <c:v>Latency (us)</c:v>
+                  <c:v>Microseconds</c:v>
                 </c:pt>
               </c:strCache>
             </c:strRef>
@@ -245,7 +245,7 @@
               <c:strCache>
                 <c:ptCount val="1"/>
                 <c:pt idx="0">
-                  <c:v>Latency (us)</c:v>
+                  <c:v>Microseconds</c:v>
                 </c:pt>
               </c:strCache>
             </c:strRef>
@@ -291,7 +291,7 @@
               <c:strCache>
                 <c:ptCount val="1"/>
                 <c:pt idx="0">
-                  <c:v>Latency (us)</c:v>
+                  <c:v>Microseconds</c:v>
                 </c:pt>
               </c:strCache>
             </c:strRef>
@@ -447,7 +447,7 @@
               <c:strCache>
                 <c:ptCount val="1"/>
                 <c:pt idx="0">
-                  <c:v>Throughput (RPS)</c:v>
+                  <c:v>Requests per Second</c:v>
                 </c:pt>
               </c:strCache>
             </c:strRef>
@@ -491,7 +491,7 @@
               <c:strCache>
                 <c:ptCount val="1"/>
                 <c:pt idx="0">
-                  <c:v>Throughput (RPS)</c:v>
+                  <c:v>Requests per Second</c:v>
                 </c:pt>
               </c:strCache>
             </c:strRef>
@@ -534,7 +534,7 @@
               <c:strCache>
                 <c:ptCount val="1"/>
                 <c:pt idx="0">
-                  <c:v>Throughput (RPS)</c:v>
+                  <c:v>Requests per Second</c:v>
                 </c:pt>
               </c:strCache>
             </c:strRef>
@@ -685,7 +685,7 @@
               <c:strCache>
                 <c:ptCount val="1"/>
                 <c:pt idx="0">
-                  <c:v>Latency (us)</c:v>
+                  <c:v>Microseconds</c:v>
                 </c:pt>
               </c:strCache>
             </c:strRef>
@@ -729,7 +729,7 @@
               <c:strCache>
                 <c:ptCount val="1"/>
                 <c:pt idx="0">
-                  <c:v>Latency (us)</c:v>
+                  <c:v>Microseconds</c:v>
                 </c:pt>
               </c:strCache>
             </c:strRef>
@@ -775,7 +775,7 @@
               <c:strCache>
                 <c:ptCount val="1"/>
                 <c:pt idx="0">
-                  <c:v>Latency (us)</c:v>
+                  <c:v>Microseconds</c:v>
                 </c:pt>
               </c:strCache>
             </c:strRef>
@@ -927,7 +927,7 @@
               <c:strCache>
                 <c:ptCount val="1"/>
                 <c:pt idx="0">
-                  <c:v>Throughput (RPS)</c:v>
+                  <c:v>Requests per Second</c:v>
                 </c:pt>
               </c:strCache>
             </c:strRef>
@@ -971,7 +971,7 @@
               <c:strCache>
                 <c:ptCount val="1"/>
                 <c:pt idx="0">
-                  <c:v>Throughput (RPS)</c:v>
+                  <c:v>Requests per Second</c:v>
                 </c:pt>
               </c:strCache>
             </c:strRef>
@@ -1017,7 +1017,7 @@
               <c:strCache>
                 <c:ptCount val="1"/>
                 <c:pt idx="0">
-                  <c:v>Throughput (RPS)</c:v>
+                  <c:v>Requests per Second</c:v>
                 </c:pt>
               </c:strCache>
             </c:strRef>
@@ -4257,7 +4257,7 @@
           <a:p>
             <a:fld id="{4F4436D8-6DD0-BA44-BFE3-D3522A759DA7}" type="slidenum">
               <a:rPr lang="en-US" smtClean="0"/>
-              <a:t>20</a:t>
+              <a:t>21</a:t>
             </a:fld>
             <a:endParaRPr lang="en-US"/>
           </a:p>
@@ -8971,8 +8971,9 @@
             <a:pPr algn="ctr"/>
             <a:r>
               <a:rPr lang="en-US" sz="2400" dirty="0" smtClean="0"/>
-              <a:t>IX DP</a:t>
-            </a:r>
+              <a:t>DP</a:t>
+            </a:r>
+            <a:endParaRPr lang="en-US" sz="2400" dirty="0" smtClean="0"/>
           </a:p>
           <a:p>
             <a:pPr algn="ctr"/>
@@ -9016,8 +9017,9 @@
             <a:pPr algn="ctr"/>
             <a:r>
               <a:rPr lang="en-US" sz="2400" dirty="0" smtClean="0"/>
-              <a:t>IX DP</a:t>
-            </a:r>
+              <a:t>DP</a:t>
+            </a:r>
+            <a:endParaRPr lang="en-US" sz="2400" dirty="0" smtClean="0"/>
           </a:p>
           <a:p>
             <a:pPr algn="ctr"/>
@@ -9135,7 +9137,7 @@
             <a:pPr algn="ctr"/>
             <a:r>
               <a:rPr lang="en-US" sz="2400" dirty="0" smtClean="0"/>
-              <a:t>IXCP</a:t>
+              <a:t>CP</a:t>
             </a:r>
             <a:endParaRPr lang="en-US" sz="2400" dirty="0"/>
           </a:p>
@@ -9534,8 +9536,9 @@
             <a:pPr algn="ctr"/>
             <a:r>
               <a:rPr lang="en-US" sz="2400" dirty="0" smtClean="0"/>
-              <a:t>IX DP</a:t>
-            </a:r>
+              <a:t>DP</a:t>
+            </a:r>
+            <a:endParaRPr lang="en-US" sz="2400" dirty="0" smtClean="0"/>
           </a:p>
           <a:p>
             <a:pPr algn="ctr"/>
@@ -9579,8 +9582,9 @@
             <a:pPr algn="ctr"/>
             <a:r>
               <a:rPr lang="en-US" sz="2400" dirty="0" smtClean="0"/>
-              <a:t>IX DP</a:t>
-            </a:r>
+              <a:t>DP</a:t>
+            </a:r>
+            <a:endParaRPr lang="en-US" sz="2400" dirty="0" smtClean="0"/>
           </a:p>
           <a:p>
             <a:pPr algn="ctr"/>
@@ -9698,7 +9702,7 @@
             <a:pPr algn="ctr"/>
             <a:r>
               <a:rPr lang="en-US" sz="2400" dirty="0" smtClean="0"/>
-              <a:t>IXCP</a:t>
+              <a:t>CP</a:t>
             </a:r>
             <a:endParaRPr lang="en-US" sz="2400" dirty="0"/>
           </a:p>
@@ -10709,7 +10713,7 @@
             <a:pPr algn="ctr"/>
             <a:r>
               <a:rPr lang="en-US" sz="2400" dirty="0" smtClean="0"/>
-              <a:t>IXCP</a:t>
+              <a:t>IX CP</a:t>
             </a:r>
             <a:endParaRPr lang="en-US" sz="2400" dirty="0"/>
           </a:p>
@@ -11806,7 +11810,7 @@
             <a:pPr algn="ctr"/>
             <a:r>
               <a:rPr lang="en-US" sz="2400" dirty="0" smtClean="0"/>
-              <a:t>IXCP</a:t>
+              <a:t>IX CP</a:t>
             </a:r>
             <a:endParaRPr lang="en-US" sz="2400" dirty="0"/>
           </a:p>
@@ -12931,7 +12935,7 @@
             <a:pPr algn="ctr"/>
             <a:r>
               <a:rPr lang="en-US" sz="2400" dirty="0" smtClean="0"/>
-              <a:t>IXCP</a:t>
+              <a:t>IX CP</a:t>
             </a:r>
             <a:endParaRPr lang="en-US" sz="2400" dirty="0"/>
           </a:p>
@@ -21718,7 +21722,7 @@
           <p:nvPr>
             <p:extLst>
               <p:ext uri="{D42A27DB-BD31-4B8C-83A1-F6EECF244321}">
-                <p14:modId xmlns:p14="http://schemas.microsoft.com/office/powerpoint/2010/main" val="342010705"/>
+                <p14:modId xmlns:p14="http://schemas.microsoft.com/office/powerpoint/2010/main" val="4082786877"/>
               </p:ext>
             </p:extLst>
           </p:nvPr>
@@ -21740,7 +21744,7 @@
           <p:nvPr>
             <p:extLst>
               <p:ext uri="{D42A27DB-BD31-4B8C-83A1-F6EECF244321}">
-                <p14:modId xmlns:p14="http://schemas.microsoft.com/office/powerpoint/2010/main" val="3931079488"/>
+                <p14:modId xmlns:p14="http://schemas.microsoft.com/office/powerpoint/2010/main" val="454847142"/>
               </p:ext>
             </p:extLst>
           </p:nvPr>
@@ -21804,21 +21808,16 @@
         </p:nvSpPr>
         <p:spPr/>
         <p:txBody>
-          <a:bodyPr>
-            <a:normAutofit fontScale="90000"/>
-          </a:bodyPr>
+          <a:bodyPr/>
           <a:lstStyle/>
           <a:p>
             <a:r>
               <a:rPr lang="en-US" dirty="0" smtClean="0"/>
-              <a:t>TCP Echo: Multicore Scalability</a:t>
-            </a:r>
-            <a:br>
-              <a:rPr lang="en-US" dirty="0" smtClean="0"/>
-            </a:br>
-            <a:r>
-              <a:rPr lang="en-US" dirty="0" smtClean="0"/>
-              <a:t>for Short Connections</a:t>
+              <a:t>TCP </a:t>
+            </a:r>
+            <a:r>
+              <a:rPr lang="en-US" dirty="0" err="1" smtClean="0"/>
+              <a:t>Netpipe</a:t>
             </a:r>
             <a:endParaRPr lang="en-US" dirty="0"/>
           </a:p>
@@ -21834,12 +21833,7 @@
             <p:ph type="sldNum" sz="quarter" idx="12"/>
           </p:nvPr>
         </p:nvSpPr>
-        <p:spPr>
-          <a:xfrm>
-            <a:off x="6439661" y="6356350"/>
-            <a:ext cx="2133600" cy="365125"/>
-          </a:xfrm>
-        </p:spPr>
+        <p:spPr/>
         <p:txBody>
           <a:bodyPr/>
           <a:lstStyle/>
@@ -21847,6 +21841,638 @@
             <a:fld id="{033E9C22-9B2B-1149-A9D9-1A86A16611D7}" type="slidenum">
               <a:rPr lang="en-US" smtClean="0"/>
               <a:t>20</a:t>
+            </a:fld>
+            <a:endParaRPr lang="en-US"/>
+          </a:p>
+        </p:txBody>
+      </p:sp>
+      <p:pic>
+        <p:nvPicPr>
+          <p:cNvPr id="6" name="Picture 5" descr="pingpong-eps-converted-to.pdf"/>
+          <p:cNvPicPr>
+            <a:picLocks noChangeAspect="1"/>
+          </p:cNvPicPr>
+          <p:nvPr/>
+        </p:nvPicPr>
+        <p:blipFill>
+          <a:blip r:embed="rId2">
+            <a:extLst>
+              <a:ext uri="{28A0092B-C50C-407E-A947-70E740481C1C}">
+                <a14:useLocalDpi xmlns:a14="http://schemas.microsoft.com/office/drawing/2010/main" val="0"/>
+              </a:ext>
+            </a:extLst>
+          </a:blip>
+          <a:stretch>
+            <a:fillRect/>
+          </a:stretch>
+        </p:blipFill>
+        <p:spPr>
+          <a:xfrm>
+            <a:off x="203814" y="1072677"/>
+            <a:ext cx="8686800" cy="5703073"/>
+          </a:xfrm>
+          <a:prstGeom prst="rect">
+            <a:avLst/>
+          </a:prstGeom>
+        </p:spPr>
+      </p:pic>
+      <p:cxnSp>
+        <p:nvCxnSpPr>
+          <p:cNvPr id="8" name="Straight Connector 7"/>
+          <p:cNvCxnSpPr/>
+          <p:nvPr/>
+        </p:nvCxnSpPr>
+        <p:spPr>
+          <a:xfrm flipV="1">
+            <a:off x="1160147" y="3559339"/>
+            <a:ext cx="7526653" cy="31360"/>
+          </a:xfrm>
+          <a:prstGeom prst="line">
+            <a:avLst/>
+          </a:prstGeom>
+          <a:ln>
+            <a:prstDash val="sysDash"/>
+          </a:ln>
+        </p:spPr>
+        <p:style>
+          <a:lnRef idx="2">
+            <a:schemeClr val="dk1"/>
+          </a:lnRef>
+          <a:fillRef idx="0">
+            <a:schemeClr val="dk1"/>
+          </a:fillRef>
+          <a:effectRef idx="1">
+            <a:schemeClr val="dk1"/>
+          </a:effectRef>
+          <a:fontRef idx="minor">
+            <a:schemeClr val="tx1"/>
+          </a:fontRef>
+        </p:style>
+      </p:cxnSp>
+      <p:sp>
+        <p:nvSpPr>
+          <p:cNvPr id="11" name="Oval Callout 10"/>
+          <p:cNvSpPr/>
+          <p:nvPr/>
+        </p:nvSpPr>
+        <p:spPr>
+          <a:xfrm>
+            <a:off x="62712" y="2210383"/>
+            <a:ext cx="1599122" cy="1102200"/>
+          </a:xfrm>
+          <a:prstGeom prst="wedgeEllipseCallout">
+            <a:avLst>
+              <a:gd name="adj1" fmla="val 50708"/>
+              <a:gd name="adj2" fmla="val 72344"/>
+            </a:avLst>
+          </a:prstGeom>
+          <a:solidFill>
+            <a:srgbClr val="FFFF00"/>
+          </a:solidFill>
+        </p:spPr>
+        <p:style>
+          <a:lnRef idx="2">
+            <a:schemeClr val="dk1"/>
+          </a:lnRef>
+          <a:fillRef idx="1">
+            <a:schemeClr val="lt1"/>
+          </a:fillRef>
+          <a:effectRef idx="0">
+            <a:schemeClr val="dk1"/>
+          </a:effectRef>
+          <a:fontRef idx="minor">
+            <a:schemeClr val="dk1"/>
+          </a:fontRef>
+        </p:style>
+        <p:txBody>
+          <a:bodyPr rtlCol="0" anchor="ctr"/>
+          <a:lstStyle/>
+          <a:p>
+            <a:pPr algn="ctr"/>
+            <a:r>
+              <a:rPr lang="en-US" sz="1600" b="1" dirty="0" smtClean="0"/>
+              <a:t>½ Bandwidth</a:t>
+            </a:r>
+          </a:p>
+          <a:p>
+            <a:pPr algn="ctr"/>
+            <a:r>
+              <a:rPr lang="en-US" sz="1600" b="1" dirty="0" smtClean="0"/>
+              <a:t>@ 20 KB</a:t>
+            </a:r>
+          </a:p>
+        </p:txBody>
+      </p:sp>
+      <p:sp>
+        <p:nvSpPr>
+          <p:cNvPr id="12" name="Oval Callout 11"/>
+          <p:cNvSpPr/>
+          <p:nvPr/>
+        </p:nvSpPr>
+        <p:spPr>
+          <a:xfrm>
+            <a:off x="3386378" y="2210383"/>
+            <a:ext cx="1599122" cy="1102200"/>
+          </a:xfrm>
+          <a:prstGeom prst="wedgeEllipseCallout">
+            <a:avLst>
+              <a:gd name="adj1" fmla="val -52233"/>
+              <a:gd name="adj2" fmla="val 72344"/>
+            </a:avLst>
+          </a:prstGeom>
+          <a:solidFill>
+            <a:srgbClr val="FFFF00"/>
+          </a:solidFill>
+        </p:spPr>
+        <p:style>
+          <a:lnRef idx="2">
+            <a:schemeClr val="dk1"/>
+          </a:lnRef>
+          <a:fillRef idx="1">
+            <a:schemeClr val="lt1"/>
+          </a:fillRef>
+          <a:effectRef idx="0">
+            <a:schemeClr val="dk1"/>
+          </a:effectRef>
+          <a:fontRef idx="minor">
+            <a:schemeClr val="dk1"/>
+          </a:fontRef>
+        </p:style>
+        <p:txBody>
+          <a:bodyPr rtlCol="0" anchor="ctr"/>
+          <a:lstStyle/>
+          <a:p>
+            <a:pPr algn="ctr"/>
+            <a:r>
+              <a:rPr lang="en-US" sz="1600" b="1" dirty="0" smtClean="0"/>
+              <a:t>½ Bandwidth</a:t>
+            </a:r>
+          </a:p>
+          <a:p>
+            <a:pPr algn="ctr"/>
+            <a:r>
+              <a:rPr lang="en-US" sz="1600" b="1" dirty="0" smtClean="0"/>
+              <a:t>@ </a:t>
+            </a:r>
+            <a:r>
+              <a:rPr lang="en-US" sz="1600" b="1" dirty="0" smtClean="0"/>
+              <a:t>135 KB</a:t>
+            </a:r>
+            <a:endParaRPr lang="en-US" sz="1600" b="1" dirty="0" smtClean="0"/>
+          </a:p>
+        </p:txBody>
+      </p:sp>
+      <p:cxnSp>
+        <p:nvCxnSpPr>
+          <p:cNvPr id="9" name="Straight Connector 8"/>
+          <p:cNvCxnSpPr/>
+          <p:nvPr/>
+        </p:nvCxnSpPr>
+        <p:spPr>
+          <a:xfrm>
+            <a:off x="1720163" y="3586300"/>
+            <a:ext cx="0" cy="2230946"/>
+          </a:xfrm>
+          <a:prstGeom prst="line">
+            <a:avLst/>
+          </a:prstGeom>
+          <a:ln>
+            <a:prstDash val="sysDash"/>
+          </a:ln>
+        </p:spPr>
+        <p:style>
+          <a:lnRef idx="2">
+            <a:schemeClr val="dk1"/>
+          </a:lnRef>
+          <a:fillRef idx="0">
+            <a:schemeClr val="dk1"/>
+          </a:fillRef>
+          <a:effectRef idx="1">
+            <a:schemeClr val="dk1"/>
+          </a:effectRef>
+          <a:fontRef idx="minor">
+            <a:schemeClr val="tx1"/>
+          </a:fontRef>
+        </p:style>
+      </p:cxnSp>
+      <p:cxnSp>
+        <p:nvCxnSpPr>
+          <p:cNvPr id="10" name="Straight Connector 9"/>
+          <p:cNvCxnSpPr/>
+          <p:nvPr/>
+        </p:nvCxnSpPr>
+        <p:spPr>
+          <a:xfrm>
+            <a:off x="3346265" y="3590699"/>
+            <a:ext cx="0" cy="2230946"/>
+          </a:xfrm>
+          <a:prstGeom prst="line">
+            <a:avLst/>
+          </a:prstGeom>
+          <a:ln>
+            <a:prstDash val="sysDash"/>
+          </a:ln>
+        </p:spPr>
+        <p:style>
+          <a:lnRef idx="2">
+            <a:schemeClr val="dk1"/>
+          </a:lnRef>
+          <a:fillRef idx="0">
+            <a:schemeClr val="dk1"/>
+          </a:fillRef>
+          <a:effectRef idx="1">
+            <a:schemeClr val="dk1"/>
+          </a:effectRef>
+          <a:fontRef idx="minor">
+            <a:schemeClr val="tx1"/>
+          </a:fontRef>
+        </p:style>
+      </p:cxnSp>
+      <p:sp>
+        <p:nvSpPr>
+          <p:cNvPr id="13" name="Oval Callout 12"/>
+          <p:cNvSpPr/>
+          <p:nvPr/>
+        </p:nvSpPr>
+        <p:spPr>
+          <a:xfrm>
+            <a:off x="203814" y="5221095"/>
+            <a:ext cx="990241" cy="600550"/>
+          </a:xfrm>
+          <a:prstGeom prst="wedgeEllipseCallout">
+            <a:avLst>
+              <a:gd name="adj1" fmla="val 74755"/>
+              <a:gd name="adj2" fmla="val 33550"/>
+            </a:avLst>
+          </a:prstGeom>
+          <a:solidFill>
+            <a:srgbClr val="FFFF00"/>
+          </a:solidFill>
+        </p:spPr>
+        <p:style>
+          <a:lnRef idx="2">
+            <a:schemeClr val="dk1"/>
+          </a:lnRef>
+          <a:fillRef idx="1">
+            <a:schemeClr val="lt1"/>
+          </a:fillRef>
+          <a:effectRef idx="0">
+            <a:schemeClr val="dk1"/>
+          </a:effectRef>
+          <a:fontRef idx="minor">
+            <a:schemeClr val="dk1"/>
+          </a:fontRef>
+        </p:style>
+        <p:txBody>
+          <a:bodyPr rtlCol="0" anchor="ctr"/>
+          <a:lstStyle/>
+          <a:p>
+            <a:pPr algn="ctr"/>
+            <a:r>
+              <a:rPr lang="en-US" sz="1600" b="1" dirty="0" smtClean="0"/>
+              <a:t>5.7 us ½ RTT</a:t>
+            </a:r>
+            <a:endParaRPr lang="en-US" sz="1600" b="1" dirty="0" smtClean="0"/>
+          </a:p>
+        </p:txBody>
+      </p:sp>
+    </p:spTree>
+    <p:extLst>
+      <p:ext uri="{BB962C8B-B14F-4D97-AF65-F5344CB8AC3E}">
+        <p14:creationId xmlns:p14="http://schemas.microsoft.com/office/powerpoint/2010/main" val="2589401825"/>
+      </p:ext>
+    </p:extLst>
+  </p:cSld>
+  <p:clrMapOvr>
+    <a:masterClrMapping/>
+  </p:clrMapOvr>
+  <p:timing>
+    <p:tnLst>
+      <p:par>
+        <p:cTn xmlns:p14="http://schemas.microsoft.com/office/powerpoint/2010/main" id="1" dur="indefinite" restart="never" nodeType="tmRoot">
+          <p:childTnLst>
+            <p:seq concurrent="1" nextAc="seek">
+              <p:cTn id="2" dur="indefinite" nodeType="mainSeq">
+                <p:childTnLst>
+                  <p:par>
+                    <p:cTn id="3" fill="hold">
+                      <p:stCondLst>
+                        <p:cond delay="indefinite"/>
+                      </p:stCondLst>
+                      <p:childTnLst>
+                        <p:par>
+                          <p:cTn id="4" fill="hold">
+                            <p:stCondLst>
+                              <p:cond delay="0"/>
+                            </p:stCondLst>
+                            <p:childTnLst>
+                              <p:par>
+                                <p:cTn id="5" presetID="1" presetClass="entr" presetSubtype="0" fill="hold" grpId="1" nodeType="clickEffect">
+                                  <p:stCondLst>
+                                    <p:cond delay="0"/>
+                                  </p:stCondLst>
+                                  <p:childTnLst>
+                                    <p:set>
+                                      <p:cBhvr>
+                                        <p:cTn id="6" dur="1" fill="hold">
+                                          <p:stCondLst>
+                                            <p:cond delay="0"/>
+                                          </p:stCondLst>
+                                        </p:cTn>
+                                        <p:tgtEl>
+                                          <p:spTgt spid="13"/>
+                                        </p:tgtEl>
+                                        <p:attrNameLst>
+                                          <p:attrName>style.visibility</p:attrName>
+                                        </p:attrNameLst>
+                                      </p:cBhvr>
+                                      <p:to>
+                                        <p:strVal val="visible"/>
+                                      </p:to>
+                                    </p:set>
+                                  </p:childTnLst>
+                                </p:cTn>
+                              </p:par>
+                            </p:childTnLst>
+                          </p:cTn>
+                        </p:par>
+                      </p:childTnLst>
+                    </p:cTn>
+                  </p:par>
+                  <p:par>
+                    <p:cTn id="7" fill="hold">
+                      <p:stCondLst>
+                        <p:cond delay="indefinite"/>
+                      </p:stCondLst>
+                      <p:childTnLst>
+                        <p:par>
+                          <p:cTn id="8" fill="hold">
+                            <p:stCondLst>
+                              <p:cond delay="0"/>
+                            </p:stCondLst>
+                            <p:childTnLst>
+                              <p:par>
+                                <p:cTn id="9" presetID="1" presetClass="entr" presetSubtype="0" fill="hold" nodeType="clickEffect">
+                                  <p:stCondLst>
+                                    <p:cond delay="0"/>
+                                  </p:stCondLst>
+                                  <p:childTnLst>
+                                    <p:set>
+                                      <p:cBhvr>
+                                        <p:cTn id="10" dur="1" fill="hold">
+                                          <p:stCondLst>
+                                            <p:cond delay="0"/>
+                                          </p:stCondLst>
+                                        </p:cTn>
+                                        <p:tgtEl>
+                                          <p:spTgt spid="9"/>
+                                        </p:tgtEl>
+                                        <p:attrNameLst>
+                                          <p:attrName>style.visibility</p:attrName>
+                                        </p:attrNameLst>
+                                      </p:cBhvr>
+                                      <p:to>
+                                        <p:strVal val="visible"/>
+                                      </p:to>
+                                    </p:set>
+                                  </p:childTnLst>
+                                </p:cTn>
+                              </p:par>
+                              <p:par>
+                                <p:cTn id="11" presetID="1" presetClass="entr" presetSubtype="0" fill="hold" grpId="0" nodeType="withEffect">
+                                  <p:stCondLst>
+                                    <p:cond delay="0"/>
+                                  </p:stCondLst>
+                                  <p:childTnLst>
+                                    <p:set>
+                                      <p:cBhvr>
+                                        <p:cTn id="12" dur="1" fill="hold">
+                                          <p:stCondLst>
+                                            <p:cond delay="0"/>
+                                          </p:stCondLst>
+                                        </p:cTn>
+                                        <p:tgtEl>
+                                          <p:spTgt spid="11"/>
+                                        </p:tgtEl>
+                                        <p:attrNameLst>
+                                          <p:attrName>style.visibility</p:attrName>
+                                        </p:attrNameLst>
+                                      </p:cBhvr>
+                                      <p:to>
+                                        <p:strVal val="visible"/>
+                                      </p:to>
+                                    </p:set>
+                                  </p:childTnLst>
+                                </p:cTn>
+                              </p:par>
+                            </p:childTnLst>
+                          </p:cTn>
+                        </p:par>
+                      </p:childTnLst>
+                    </p:cTn>
+                  </p:par>
+                  <p:par>
+                    <p:cTn id="13" fill="hold">
+                      <p:stCondLst>
+                        <p:cond delay="indefinite"/>
+                      </p:stCondLst>
+                      <p:childTnLst>
+                        <p:par>
+                          <p:cTn id="14" fill="hold">
+                            <p:stCondLst>
+                              <p:cond delay="0"/>
+                            </p:stCondLst>
+                            <p:childTnLst>
+                              <p:par>
+                                <p:cTn id="15" presetID="1" presetClass="entr" presetSubtype="0" fill="hold" nodeType="clickEffect">
+                                  <p:stCondLst>
+                                    <p:cond delay="0"/>
+                                  </p:stCondLst>
+                                  <p:childTnLst>
+                                    <p:set>
+                                      <p:cBhvr>
+                                        <p:cTn id="16" dur="1" fill="hold">
+                                          <p:stCondLst>
+                                            <p:cond delay="0"/>
+                                          </p:stCondLst>
+                                        </p:cTn>
+                                        <p:tgtEl>
+                                          <p:spTgt spid="10"/>
+                                        </p:tgtEl>
+                                        <p:attrNameLst>
+                                          <p:attrName>style.visibility</p:attrName>
+                                        </p:attrNameLst>
+                                      </p:cBhvr>
+                                      <p:to>
+                                        <p:strVal val="visible"/>
+                                      </p:to>
+                                    </p:set>
+                                  </p:childTnLst>
+                                </p:cTn>
+                              </p:par>
+                              <p:par>
+                                <p:cTn id="17" presetID="1" presetClass="entr" presetSubtype="0" fill="hold" grpId="0" nodeType="withEffect">
+                                  <p:stCondLst>
+                                    <p:cond delay="0"/>
+                                  </p:stCondLst>
+                                  <p:childTnLst>
+                                    <p:set>
+                                      <p:cBhvr>
+                                        <p:cTn id="18" dur="1" fill="hold">
+                                          <p:stCondLst>
+                                            <p:cond delay="0"/>
+                                          </p:stCondLst>
+                                        </p:cTn>
+                                        <p:tgtEl>
+                                          <p:spTgt spid="12"/>
+                                        </p:tgtEl>
+                                        <p:attrNameLst>
+                                          <p:attrName>style.visibility</p:attrName>
+                                        </p:attrNameLst>
+                                      </p:cBhvr>
+                                      <p:to>
+                                        <p:strVal val="visible"/>
+                                      </p:to>
+                                    </p:set>
+                                  </p:childTnLst>
+                                </p:cTn>
+                              </p:par>
+                              <p:par>
+                                <p:cTn id="19" presetID="1" presetClass="entr" presetSubtype="0" fill="hold" grpId="0" nodeType="withEffect">
+                                  <p:stCondLst>
+                                    <p:cond delay="0"/>
+                                  </p:stCondLst>
+                                  <p:childTnLst>
+                                    <p:set>
+                                      <p:cBhvr>
+                                        <p:cTn id="20" dur="1" fill="hold">
+                                          <p:stCondLst>
+                                            <p:cond delay="0"/>
+                                          </p:stCondLst>
+                                        </p:cTn>
+                                        <p:tgtEl>
+                                          <p:spTgt spid="13"/>
+                                        </p:tgtEl>
+                                        <p:attrNameLst>
+                                          <p:attrName>style.visibility</p:attrName>
+                                        </p:attrNameLst>
+                                      </p:cBhvr>
+                                      <p:to>
+                                        <p:strVal val="visible"/>
+                                      </p:to>
+                                    </p:set>
+                                  </p:childTnLst>
+                                </p:cTn>
+                              </p:par>
+                            </p:childTnLst>
+                          </p:cTn>
+                        </p:par>
+                      </p:childTnLst>
+                    </p:cTn>
+                  </p:par>
+                </p:childTnLst>
+              </p:cTn>
+              <p:prevCondLst>
+                <p:cond evt="onPrev" delay="0">
+                  <p:tgtEl>
+                    <p:sldTgt/>
+                  </p:tgtEl>
+                </p:cond>
+              </p:prevCondLst>
+              <p:nextCondLst>
+                <p:cond evt="onNext" delay="0">
+                  <p:tgtEl>
+                    <p:sldTgt/>
+                  </p:tgtEl>
+                </p:cond>
+              </p:nextCondLst>
+            </p:seq>
+          </p:childTnLst>
+        </p:cTn>
+      </p:par>
+    </p:tnLst>
+    <p:bldLst>
+      <p:bldP spid="11" grpId="0" animBg="1"/>
+      <p:bldP spid="12" grpId="0" animBg="1"/>
+      <p:bldP spid="13" grpId="0" animBg="1"/>
+      <p:bldP spid="13" grpId="1" animBg="1"/>
+    </p:bldLst>
+  </p:timing>
+</p:sld>
+</file>
+
+<file path=ppt/slides/slide21.xml><?xml version="1.0" encoding="utf-8"?>
+<p:sld xmlns:a="http://schemas.openxmlformats.org/drawingml/2006/main" xmlns:r="http://schemas.openxmlformats.org/officeDocument/2006/relationships" xmlns:p="http://schemas.openxmlformats.org/presentationml/2006/main">
+  <p:cSld>
+    <p:spTree>
+      <p:nvGrpSpPr>
+        <p:cNvPr id="1" name=""/>
+        <p:cNvGrpSpPr/>
+        <p:nvPr/>
+      </p:nvGrpSpPr>
+      <p:grpSpPr>
+        <a:xfrm>
+          <a:off x="0" y="0"/>
+          <a:ext cx="0" cy="0"/>
+          <a:chOff x="0" y="0"/>
+          <a:chExt cx="0" cy="0"/>
+        </a:xfrm>
+      </p:grpSpPr>
+      <p:sp>
+        <p:nvSpPr>
+          <p:cNvPr id="2" name="Title 1"/>
+          <p:cNvSpPr>
+            <a:spLocks noGrp="1"/>
+          </p:cNvSpPr>
+          <p:nvPr>
+            <p:ph type="title"/>
+          </p:nvPr>
+        </p:nvSpPr>
+        <p:spPr/>
+        <p:txBody>
+          <a:bodyPr>
+            <a:normAutofit fontScale="90000"/>
+          </a:bodyPr>
+          <a:lstStyle/>
+          <a:p>
+            <a:r>
+              <a:rPr lang="en-US" dirty="0" smtClean="0"/>
+              <a:t>TCP Echo: Multicore Scalability</a:t>
+            </a:r>
+            <a:br>
+              <a:rPr lang="en-US" dirty="0" smtClean="0"/>
+            </a:br>
+            <a:r>
+              <a:rPr lang="en-US" dirty="0" smtClean="0"/>
+              <a:t>for Short Connections</a:t>
+            </a:r>
+            <a:endParaRPr lang="en-US" dirty="0"/>
+          </a:p>
+        </p:txBody>
+      </p:sp>
+      <p:sp>
+        <p:nvSpPr>
+          <p:cNvPr id="4" name="Slide Number Placeholder 3"/>
+          <p:cNvSpPr>
+            <a:spLocks noGrp="1"/>
+          </p:cNvSpPr>
+          <p:nvPr>
+            <p:ph type="sldNum" sz="quarter" idx="12"/>
+          </p:nvPr>
+        </p:nvSpPr>
+        <p:spPr>
+          <a:xfrm>
+            <a:off x="6439661" y="6356350"/>
+            <a:ext cx="2133600" cy="365125"/>
+          </a:xfrm>
+        </p:spPr>
+        <p:txBody>
+          <a:bodyPr/>
+          <a:lstStyle/>
+          <a:p>
+            <a:fld id="{033E9C22-9B2B-1149-A9D9-1A86A16611D7}" type="slidenum">
+              <a:rPr lang="en-US" smtClean="0"/>
+              <a:t>21</a:t>
             </a:fld>
             <a:endParaRPr lang="en-US"/>
           </a:p>
@@ -22576,628 +23202,6 @@
 </p:sld>
 </file>
 
-<file path=ppt/slides/slide21.xml><?xml version="1.0" encoding="utf-8"?>
-<p:sld xmlns:a="http://schemas.openxmlformats.org/drawingml/2006/main" xmlns:r="http://schemas.openxmlformats.org/officeDocument/2006/relationships" xmlns:p="http://schemas.openxmlformats.org/presentationml/2006/main">
-  <p:cSld>
-    <p:spTree>
-      <p:nvGrpSpPr>
-        <p:cNvPr id="1" name=""/>
-        <p:cNvGrpSpPr/>
-        <p:nvPr/>
-      </p:nvGrpSpPr>
-      <p:grpSpPr>
-        <a:xfrm>
-          <a:off x="0" y="0"/>
-          <a:ext cx="0" cy="0"/>
-          <a:chOff x="0" y="0"/>
-          <a:chExt cx="0" cy="0"/>
-        </a:xfrm>
-      </p:grpSpPr>
-      <p:sp>
-        <p:nvSpPr>
-          <p:cNvPr id="2" name="Title 1"/>
-          <p:cNvSpPr>
-            <a:spLocks noGrp="1"/>
-          </p:cNvSpPr>
-          <p:nvPr>
-            <p:ph type="title"/>
-          </p:nvPr>
-        </p:nvSpPr>
-        <p:spPr/>
-        <p:txBody>
-          <a:bodyPr/>
-          <a:lstStyle/>
-          <a:p>
-            <a:r>
-              <a:rPr lang="en-US" dirty="0" smtClean="0"/>
-              <a:t>TCP </a:t>
-            </a:r>
-            <a:r>
-              <a:rPr lang="en-US" dirty="0" err="1" smtClean="0"/>
-              <a:t>Netpipe</a:t>
-            </a:r>
-            <a:endParaRPr lang="en-US" dirty="0"/>
-          </a:p>
-        </p:txBody>
-      </p:sp>
-      <p:sp>
-        <p:nvSpPr>
-          <p:cNvPr id="4" name="Slide Number Placeholder 3"/>
-          <p:cNvSpPr>
-            <a:spLocks noGrp="1"/>
-          </p:cNvSpPr>
-          <p:nvPr>
-            <p:ph type="sldNum" sz="quarter" idx="12"/>
-          </p:nvPr>
-        </p:nvSpPr>
-        <p:spPr/>
-        <p:txBody>
-          <a:bodyPr/>
-          <a:lstStyle/>
-          <a:p>
-            <a:fld id="{033E9C22-9B2B-1149-A9D9-1A86A16611D7}" type="slidenum">
-              <a:rPr lang="en-US" smtClean="0"/>
-              <a:t>21</a:t>
-            </a:fld>
-            <a:endParaRPr lang="en-US"/>
-          </a:p>
-        </p:txBody>
-      </p:sp>
-      <p:pic>
-        <p:nvPicPr>
-          <p:cNvPr id="6" name="Picture 5" descr="pingpong-eps-converted-to.pdf"/>
-          <p:cNvPicPr>
-            <a:picLocks noChangeAspect="1"/>
-          </p:cNvPicPr>
-          <p:nvPr/>
-        </p:nvPicPr>
-        <p:blipFill>
-          <a:blip r:embed="rId2">
-            <a:extLst>
-              <a:ext uri="{28A0092B-C50C-407E-A947-70E740481C1C}">
-                <a14:useLocalDpi xmlns:a14="http://schemas.microsoft.com/office/drawing/2010/main" val="0"/>
-              </a:ext>
-            </a:extLst>
-          </a:blip>
-          <a:stretch>
-            <a:fillRect/>
-          </a:stretch>
-        </p:blipFill>
-        <p:spPr>
-          <a:xfrm>
-            <a:off x="203814" y="1072677"/>
-            <a:ext cx="8686800" cy="5703073"/>
-          </a:xfrm>
-          <a:prstGeom prst="rect">
-            <a:avLst/>
-          </a:prstGeom>
-        </p:spPr>
-      </p:pic>
-      <p:cxnSp>
-        <p:nvCxnSpPr>
-          <p:cNvPr id="8" name="Straight Connector 7"/>
-          <p:cNvCxnSpPr/>
-          <p:nvPr/>
-        </p:nvCxnSpPr>
-        <p:spPr>
-          <a:xfrm flipV="1">
-            <a:off x="1160147" y="3559339"/>
-            <a:ext cx="7526653" cy="31360"/>
-          </a:xfrm>
-          <a:prstGeom prst="line">
-            <a:avLst/>
-          </a:prstGeom>
-          <a:ln>
-            <a:prstDash val="sysDash"/>
-          </a:ln>
-        </p:spPr>
-        <p:style>
-          <a:lnRef idx="2">
-            <a:schemeClr val="dk1"/>
-          </a:lnRef>
-          <a:fillRef idx="0">
-            <a:schemeClr val="dk1"/>
-          </a:fillRef>
-          <a:effectRef idx="1">
-            <a:schemeClr val="dk1"/>
-          </a:effectRef>
-          <a:fontRef idx="minor">
-            <a:schemeClr val="tx1"/>
-          </a:fontRef>
-        </p:style>
-      </p:cxnSp>
-      <p:sp>
-        <p:nvSpPr>
-          <p:cNvPr id="11" name="Oval Callout 10"/>
-          <p:cNvSpPr/>
-          <p:nvPr/>
-        </p:nvSpPr>
-        <p:spPr>
-          <a:xfrm>
-            <a:off x="62712" y="2210383"/>
-            <a:ext cx="1599122" cy="1102200"/>
-          </a:xfrm>
-          <a:prstGeom prst="wedgeEllipseCallout">
-            <a:avLst>
-              <a:gd name="adj1" fmla="val 50708"/>
-              <a:gd name="adj2" fmla="val 72344"/>
-            </a:avLst>
-          </a:prstGeom>
-          <a:solidFill>
-            <a:srgbClr val="FFFF00"/>
-          </a:solidFill>
-        </p:spPr>
-        <p:style>
-          <a:lnRef idx="2">
-            <a:schemeClr val="dk1"/>
-          </a:lnRef>
-          <a:fillRef idx="1">
-            <a:schemeClr val="lt1"/>
-          </a:fillRef>
-          <a:effectRef idx="0">
-            <a:schemeClr val="dk1"/>
-          </a:effectRef>
-          <a:fontRef idx="minor">
-            <a:schemeClr val="dk1"/>
-          </a:fontRef>
-        </p:style>
-        <p:txBody>
-          <a:bodyPr rtlCol="0" anchor="ctr"/>
-          <a:lstStyle/>
-          <a:p>
-            <a:pPr algn="ctr"/>
-            <a:r>
-              <a:rPr lang="en-US" sz="1600" b="1" dirty="0" smtClean="0"/>
-              <a:t>½ Bandwidth</a:t>
-            </a:r>
-          </a:p>
-          <a:p>
-            <a:pPr algn="ctr"/>
-            <a:r>
-              <a:rPr lang="en-US" sz="1600" b="1" dirty="0" smtClean="0"/>
-              <a:t>@ 20 KB</a:t>
-            </a:r>
-          </a:p>
-        </p:txBody>
-      </p:sp>
-      <p:sp>
-        <p:nvSpPr>
-          <p:cNvPr id="12" name="Oval Callout 11"/>
-          <p:cNvSpPr/>
-          <p:nvPr/>
-        </p:nvSpPr>
-        <p:spPr>
-          <a:xfrm>
-            <a:off x="3386378" y="2210383"/>
-            <a:ext cx="1599122" cy="1102200"/>
-          </a:xfrm>
-          <a:prstGeom prst="wedgeEllipseCallout">
-            <a:avLst>
-              <a:gd name="adj1" fmla="val -52233"/>
-              <a:gd name="adj2" fmla="val 72344"/>
-            </a:avLst>
-          </a:prstGeom>
-          <a:solidFill>
-            <a:srgbClr val="FFFF00"/>
-          </a:solidFill>
-        </p:spPr>
-        <p:style>
-          <a:lnRef idx="2">
-            <a:schemeClr val="dk1"/>
-          </a:lnRef>
-          <a:fillRef idx="1">
-            <a:schemeClr val="lt1"/>
-          </a:fillRef>
-          <a:effectRef idx="0">
-            <a:schemeClr val="dk1"/>
-          </a:effectRef>
-          <a:fontRef idx="minor">
-            <a:schemeClr val="dk1"/>
-          </a:fontRef>
-        </p:style>
-        <p:txBody>
-          <a:bodyPr rtlCol="0" anchor="ctr"/>
-          <a:lstStyle/>
-          <a:p>
-            <a:pPr algn="ctr"/>
-            <a:r>
-              <a:rPr lang="en-US" sz="1600" b="1" dirty="0" smtClean="0"/>
-              <a:t>½ Bandwidth</a:t>
-            </a:r>
-          </a:p>
-          <a:p>
-            <a:pPr algn="ctr"/>
-            <a:r>
-              <a:rPr lang="en-US" sz="1600" b="1" dirty="0" smtClean="0"/>
-              <a:t>@ </a:t>
-            </a:r>
-            <a:r>
-              <a:rPr lang="en-US" sz="1600" b="1" dirty="0" smtClean="0"/>
-              <a:t>135 KB</a:t>
-            </a:r>
-            <a:endParaRPr lang="en-US" sz="1600" b="1" dirty="0" smtClean="0"/>
-          </a:p>
-        </p:txBody>
-      </p:sp>
-      <p:cxnSp>
-        <p:nvCxnSpPr>
-          <p:cNvPr id="9" name="Straight Connector 8"/>
-          <p:cNvCxnSpPr/>
-          <p:nvPr/>
-        </p:nvCxnSpPr>
-        <p:spPr>
-          <a:xfrm>
-            <a:off x="1720163" y="3586300"/>
-            <a:ext cx="0" cy="2230946"/>
-          </a:xfrm>
-          <a:prstGeom prst="line">
-            <a:avLst/>
-          </a:prstGeom>
-          <a:ln>
-            <a:prstDash val="sysDash"/>
-          </a:ln>
-        </p:spPr>
-        <p:style>
-          <a:lnRef idx="2">
-            <a:schemeClr val="dk1"/>
-          </a:lnRef>
-          <a:fillRef idx="0">
-            <a:schemeClr val="dk1"/>
-          </a:fillRef>
-          <a:effectRef idx="1">
-            <a:schemeClr val="dk1"/>
-          </a:effectRef>
-          <a:fontRef idx="minor">
-            <a:schemeClr val="tx1"/>
-          </a:fontRef>
-        </p:style>
-      </p:cxnSp>
-      <p:cxnSp>
-        <p:nvCxnSpPr>
-          <p:cNvPr id="10" name="Straight Connector 9"/>
-          <p:cNvCxnSpPr/>
-          <p:nvPr/>
-        </p:nvCxnSpPr>
-        <p:spPr>
-          <a:xfrm>
-            <a:off x="3346265" y="3590699"/>
-            <a:ext cx="0" cy="2230946"/>
-          </a:xfrm>
-          <a:prstGeom prst="line">
-            <a:avLst/>
-          </a:prstGeom>
-          <a:ln>
-            <a:prstDash val="sysDash"/>
-          </a:ln>
-        </p:spPr>
-        <p:style>
-          <a:lnRef idx="2">
-            <a:schemeClr val="dk1"/>
-          </a:lnRef>
-          <a:fillRef idx="0">
-            <a:schemeClr val="dk1"/>
-          </a:fillRef>
-          <a:effectRef idx="1">
-            <a:schemeClr val="dk1"/>
-          </a:effectRef>
-          <a:fontRef idx="minor">
-            <a:schemeClr val="tx1"/>
-          </a:fontRef>
-        </p:style>
-      </p:cxnSp>
-      <p:sp>
-        <p:nvSpPr>
-          <p:cNvPr id="13" name="Oval Callout 12"/>
-          <p:cNvSpPr/>
-          <p:nvPr/>
-        </p:nvSpPr>
-        <p:spPr>
-          <a:xfrm>
-            <a:off x="203814" y="5221095"/>
-            <a:ext cx="990241" cy="600550"/>
-          </a:xfrm>
-          <a:prstGeom prst="wedgeEllipseCallout">
-            <a:avLst>
-              <a:gd name="adj1" fmla="val 74755"/>
-              <a:gd name="adj2" fmla="val 33550"/>
-            </a:avLst>
-          </a:prstGeom>
-          <a:solidFill>
-            <a:srgbClr val="FFFF00"/>
-          </a:solidFill>
-        </p:spPr>
-        <p:style>
-          <a:lnRef idx="2">
-            <a:schemeClr val="dk1"/>
-          </a:lnRef>
-          <a:fillRef idx="1">
-            <a:schemeClr val="lt1"/>
-          </a:fillRef>
-          <a:effectRef idx="0">
-            <a:schemeClr val="dk1"/>
-          </a:effectRef>
-          <a:fontRef idx="minor">
-            <a:schemeClr val="dk1"/>
-          </a:fontRef>
-        </p:style>
-        <p:txBody>
-          <a:bodyPr rtlCol="0" anchor="ctr"/>
-          <a:lstStyle/>
-          <a:p>
-            <a:pPr algn="ctr"/>
-            <a:r>
-              <a:rPr lang="en-US" sz="1600" b="1" dirty="0" smtClean="0"/>
-              <a:t>5.7 us ½ RTT</a:t>
-            </a:r>
-            <a:endParaRPr lang="en-US" sz="1600" b="1" dirty="0" smtClean="0"/>
-          </a:p>
-        </p:txBody>
-      </p:sp>
-    </p:spTree>
-    <p:extLst>
-      <p:ext uri="{BB962C8B-B14F-4D97-AF65-F5344CB8AC3E}">
-        <p14:creationId xmlns:p14="http://schemas.microsoft.com/office/powerpoint/2010/main" val="2589401825"/>
-      </p:ext>
-    </p:extLst>
-  </p:cSld>
-  <p:clrMapOvr>
-    <a:masterClrMapping/>
-  </p:clrMapOvr>
-  <p:timing>
-    <p:tnLst>
-      <p:par>
-        <p:cTn xmlns:p14="http://schemas.microsoft.com/office/powerpoint/2010/main" id="1" dur="indefinite" restart="never" nodeType="tmRoot">
-          <p:childTnLst>
-            <p:seq concurrent="1" nextAc="seek">
-              <p:cTn id="2" dur="indefinite" nodeType="mainSeq">
-                <p:childTnLst>
-                  <p:par>
-                    <p:cTn id="3" fill="hold">
-                      <p:stCondLst>
-                        <p:cond delay="indefinite"/>
-                      </p:stCondLst>
-                      <p:childTnLst>
-                        <p:par>
-                          <p:cTn id="4" fill="hold">
-                            <p:stCondLst>
-                              <p:cond delay="0"/>
-                            </p:stCondLst>
-                            <p:childTnLst>
-                              <p:par>
-                                <p:cTn id="5" presetID="1" presetClass="entr" presetSubtype="0" fill="hold" grpId="1" nodeType="clickEffect">
-                                  <p:stCondLst>
-                                    <p:cond delay="0"/>
-                                  </p:stCondLst>
-                                  <p:childTnLst>
-                                    <p:set>
-                                      <p:cBhvr>
-                                        <p:cTn id="6" dur="1" fill="hold">
-                                          <p:stCondLst>
-                                            <p:cond delay="0"/>
-                                          </p:stCondLst>
-                                        </p:cTn>
-                                        <p:tgtEl>
-                                          <p:spTgt spid="13"/>
-                                        </p:tgtEl>
-                                        <p:attrNameLst>
-                                          <p:attrName>style.visibility</p:attrName>
-                                        </p:attrNameLst>
-                                      </p:cBhvr>
-                                      <p:to>
-                                        <p:strVal val="visible"/>
-                                      </p:to>
-                                    </p:set>
-                                  </p:childTnLst>
-                                </p:cTn>
-                              </p:par>
-                            </p:childTnLst>
-                          </p:cTn>
-                        </p:par>
-                      </p:childTnLst>
-                    </p:cTn>
-                  </p:par>
-                  <p:par>
-                    <p:cTn id="7" fill="hold">
-                      <p:stCondLst>
-                        <p:cond delay="indefinite"/>
-                      </p:stCondLst>
-                      <p:childTnLst>
-                        <p:par>
-                          <p:cTn id="8" fill="hold">
-                            <p:stCondLst>
-                              <p:cond delay="0"/>
-                            </p:stCondLst>
-                            <p:childTnLst>
-                              <p:par>
-                                <p:cTn id="9" presetID="1" presetClass="entr" presetSubtype="0" fill="hold" nodeType="clickEffect">
-                                  <p:stCondLst>
-                                    <p:cond delay="0"/>
-                                  </p:stCondLst>
-                                  <p:childTnLst>
-                                    <p:set>
-                                      <p:cBhvr>
-                                        <p:cTn id="10" dur="1" fill="hold">
-                                          <p:stCondLst>
-                                            <p:cond delay="0"/>
-                                          </p:stCondLst>
-                                        </p:cTn>
-                                        <p:tgtEl>
-                                          <p:spTgt spid="9"/>
-                                        </p:tgtEl>
-                                        <p:attrNameLst>
-                                          <p:attrName>style.visibility</p:attrName>
-                                        </p:attrNameLst>
-                                      </p:cBhvr>
-                                      <p:to>
-                                        <p:strVal val="visible"/>
-                                      </p:to>
-                                    </p:set>
-                                  </p:childTnLst>
-                                </p:cTn>
-                              </p:par>
-                              <p:par>
-                                <p:cTn id="11" presetID="1" presetClass="entr" presetSubtype="0" fill="hold" grpId="0" nodeType="withEffect">
-                                  <p:stCondLst>
-                                    <p:cond delay="0"/>
-                                  </p:stCondLst>
-                                  <p:childTnLst>
-                                    <p:set>
-                                      <p:cBhvr>
-                                        <p:cTn id="12" dur="1" fill="hold">
-                                          <p:stCondLst>
-                                            <p:cond delay="0"/>
-                                          </p:stCondLst>
-                                        </p:cTn>
-                                        <p:tgtEl>
-                                          <p:spTgt spid="11"/>
-                                        </p:tgtEl>
-                                        <p:attrNameLst>
-                                          <p:attrName>style.visibility</p:attrName>
-                                        </p:attrNameLst>
-                                      </p:cBhvr>
-                                      <p:to>
-                                        <p:strVal val="visible"/>
-                                      </p:to>
-                                    </p:set>
-                                  </p:childTnLst>
-                                </p:cTn>
-                              </p:par>
-                            </p:childTnLst>
-                          </p:cTn>
-                        </p:par>
-                      </p:childTnLst>
-                    </p:cTn>
-                  </p:par>
-                  <p:par>
-                    <p:cTn id="13" fill="hold">
-                      <p:stCondLst>
-                        <p:cond delay="indefinite"/>
-                      </p:stCondLst>
-                      <p:childTnLst>
-                        <p:par>
-                          <p:cTn id="14" fill="hold">
-                            <p:stCondLst>
-                              <p:cond delay="0"/>
-                            </p:stCondLst>
-                            <p:childTnLst>
-                              <p:par>
-                                <p:cTn id="15" presetID="1" presetClass="entr" presetSubtype="0" fill="hold" nodeType="clickEffect">
-                                  <p:stCondLst>
-                                    <p:cond delay="0"/>
-                                  </p:stCondLst>
-                                  <p:childTnLst>
-                                    <p:set>
-                                      <p:cBhvr>
-                                        <p:cTn id="16" dur="1" fill="hold">
-                                          <p:stCondLst>
-                                            <p:cond delay="0"/>
-                                          </p:stCondLst>
-                                        </p:cTn>
-                                        <p:tgtEl>
-                                          <p:spTgt spid="10"/>
-                                        </p:tgtEl>
-                                        <p:attrNameLst>
-                                          <p:attrName>style.visibility</p:attrName>
-                                        </p:attrNameLst>
-                                      </p:cBhvr>
-                                      <p:to>
-                                        <p:strVal val="visible"/>
-                                      </p:to>
-                                    </p:set>
-                                  </p:childTnLst>
-                                </p:cTn>
-                              </p:par>
-                              <p:par>
-                                <p:cTn id="17" presetID="1" presetClass="entr" presetSubtype="0" fill="hold" grpId="0" nodeType="withEffect">
-                                  <p:stCondLst>
-                                    <p:cond delay="0"/>
-                                  </p:stCondLst>
-                                  <p:childTnLst>
-                                    <p:set>
-                                      <p:cBhvr>
-                                        <p:cTn id="18" dur="1" fill="hold">
-                                          <p:stCondLst>
-                                            <p:cond delay="0"/>
-                                          </p:stCondLst>
-                                        </p:cTn>
-                                        <p:tgtEl>
-                                          <p:spTgt spid="12"/>
-                                        </p:tgtEl>
-                                        <p:attrNameLst>
-                                          <p:attrName>style.visibility</p:attrName>
-                                        </p:attrNameLst>
-                                      </p:cBhvr>
-                                      <p:to>
-                                        <p:strVal val="visible"/>
-                                      </p:to>
-                                    </p:set>
-                                  </p:childTnLst>
-                                </p:cTn>
-                              </p:par>
-                              <p:par>
-                                <p:cTn id="19" presetID="1" presetClass="entr" presetSubtype="0" fill="hold" grpId="0" nodeType="withEffect">
-                                  <p:stCondLst>
-                                    <p:cond delay="0"/>
-                                  </p:stCondLst>
-                                  <p:childTnLst>
-                                    <p:set>
-                                      <p:cBhvr>
-                                        <p:cTn id="20" dur="1" fill="hold">
-                                          <p:stCondLst>
-                                            <p:cond delay="0"/>
-                                          </p:stCondLst>
-                                        </p:cTn>
-                                        <p:tgtEl>
-                                          <p:spTgt spid="13"/>
-                                        </p:tgtEl>
-                                        <p:attrNameLst>
-                                          <p:attrName>style.visibility</p:attrName>
-                                        </p:attrNameLst>
-                                      </p:cBhvr>
-                                      <p:to>
-                                        <p:strVal val="visible"/>
-                                      </p:to>
-                                    </p:set>
-                                  </p:childTnLst>
-                                </p:cTn>
-                              </p:par>
-                            </p:childTnLst>
-                          </p:cTn>
-                        </p:par>
-                      </p:childTnLst>
-                    </p:cTn>
-                  </p:par>
-                </p:childTnLst>
-              </p:cTn>
-              <p:prevCondLst>
-                <p:cond evt="onPrev" delay="0">
-                  <p:tgtEl>
-                    <p:sldTgt/>
-                  </p:tgtEl>
-                </p:cond>
-              </p:prevCondLst>
-              <p:nextCondLst>
-                <p:cond evt="onNext" delay="0">
-                  <p:tgtEl>
-                    <p:sldTgt/>
-                  </p:tgtEl>
-                </p:cond>
-              </p:nextCondLst>
-            </p:seq>
-          </p:childTnLst>
-        </p:cTn>
-      </p:par>
-    </p:tnLst>
-    <p:bldLst>
-      <p:bldP spid="11" grpId="0" animBg="1"/>
-      <p:bldP spid="12" grpId="0" animBg="1"/>
-      <p:bldP spid="13" grpId="0" animBg="1"/>
-      <p:bldP spid="13" grpId="1" animBg="1"/>
-    </p:bldLst>
-  </p:timing>
-</p:sld>
-</file>
-
 <file path=ppt/slides/slide22.xml><?xml version="1.0" encoding="utf-8"?>
 <p:sld xmlns:a="http://schemas.openxmlformats.org/drawingml/2006/main" xmlns:r="http://schemas.openxmlformats.org/officeDocument/2006/relationships" xmlns:p="http://schemas.openxmlformats.org/presentationml/2006/main">
   <p:cSld>
@@ -24390,7 +24394,25 @@
           <a:p>
             <a:r>
               <a:rPr lang="en-US" dirty="0" smtClean="0"/>
-              <a:t>Efficient access to HW, without sacrificing security, through virtualization</a:t>
+              <a:t>A protected </a:t>
+            </a:r>
+            <a:r>
+              <a:rPr lang="en-US" dirty="0" err="1" smtClean="0"/>
+              <a:t>dataplane</a:t>
+            </a:r>
+            <a:r>
+              <a:rPr lang="en-US" dirty="0" smtClean="0"/>
+              <a:t> OS for datacenter applications with an event-driven model and demanding connection scalability requirements</a:t>
+            </a:r>
+          </a:p>
+          <a:p>
+            <a:r>
+              <a:rPr lang="en-US" dirty="0" smtClean="0"/>
+              <a:t>Efficient </a:t>
+            </a:r>
+            <a:r>
+              <a:rPr lang="en-US" dirty="0" smtClean="0"/>
+              <a:t>access to HW, without sacrificing security, through virtualization</a:t>
             </a:r>
           </a:p>
           <a:p>
@@ -24403,6 +24425,14 @@
               <a:t>High throughput and low latency enabled by </a:t>
             </a:r>
             <a:r>
+              <a:rPr lang="en-US" dirty="0" smtClean="0">
+                <a:solidFill>
+                  <a:srgbClr val="000000"/>
+                </a:solidFill>
+              </a:rPr>
+              <a:t>a </a:t>
+            </a:r>
+            <a:r>
               <a:rPr lang="en-US" dirty="0" err="1" smtClean="0">
                 <a:solidFill>
                   <a:srgbClr val="000000"/>
@@ -24416,8 +24446,29 @@
                   <a:srgbClr val="000000"/>
                 </a:solidFill>
               </a:rPr>
-              <a:t> execution pipeline</a:t>
-            </a:r>
+              <a:t> </a:t>
+            </a:r>
+            <a:r>
+              <a:rPr lang="en-US" dirty="0" smtClean="0">
+                <a:solidFill>
+                  <a:srgbClr val="000000"/>
+                </a:solidFill>
+              </a:rPr>
+              <a:t>execution </a:t>
+            </a:r>
+            <a:r>
+              <a:rPr lang="en-US" dirty="0" smtClean="0">
+                <a:solidFill>
+                  <a:srgbClr val="000000"/>
+                </a:solidFill>
+              </a:rPr>
+              <a:t>model</a:t>
+            </a:r>
+            <a:endParaRPr lang="en-US" dirty="0" smtClean="0">
+              <a:solidFill>
+                <a:srgbClr val="000000"/>
+              </a:solidFill>
+            </a:endParaRPr>
           </a:p>
         </p:txBody>
       </p:sp>
@@ -24723,7 +24774,7 @@
             <a:pPr algn="ctr"/>
             <a:r>
               <a:rPr lang="en-US" sz="2400" dirty="0" smtClean="0"/>
-              <a:t>IXCP</a:t>
+              <a:t>IX CP</a:t>
             </a:r>
             <a:endParaRPr lang="en-US" sz="2400" dirty="0"/>
           </a:p>
@@ -27825,7 +27876,7 @@
           <p:nvPr>
             <p:extLst>
               <p:ext uri="{D42A27DB-BD31-4B8C-83A1-F6EECF244321}">
-                <p14:modId xmlns:p14="http://schemas.microsoft.com/office/powerpoint/2010/main" val="3245981372"/>
+                <p14:modId xmlns:p14="http://schemas.microsoft.com/office/powerpoint/2010/main" val="3062786376"/>
               </p:ext>
             </p:extLst>
           </p:nvPr>
@@ -27847,7 +27898,7 @@
           <p:nvPr>
             <p:extLst>
               <p:ext uri="{D42A27DB-BD31-4B8C-83A1-F6EECF244321}">
-                <p14:modId xmlns:p14="http://schemas.microsoft.com/office/powerpoint/2010/main" val="4237689575"/>
+                <p14:modId xmlns:p14="http://schemas.microsoft.com/office/powerpoint/2010/main" val="1663606694"/>
               </p:ext>
             </p:extLst>
           </p:nvPr>

</xml_diff>